<commit_message>
correção do power e artigo
</commit_message>
<xml_diff>
--- a/Federal University of Sergipe.pptx
+++ b/Federal University of Sergipe.pptx
@@ -267,7 +267,7 @@
           <a:p>
             <a:fld id="{7F4DE44C-4E58-4341-A1AF-2DD2D02351DF}" type="datetimeFigureOut">
               <a:rPr lang="pt-BR" smtClean="0"/>
-              <a:t>25/06/2018</a:t>
+              <a:t>27/06/2018</a:t>
             </a:fld>
             <a:endParaRPr lang="pt-BR"/>
           </a:p>
@@ -465,7 +465,7 @@
           <a:p>
             <a:fld id="{7F4DE44C-4E58-4341-A1AF-2DD2D02351DF}" type="datetimeFigureOut">
               <a:rPr lang="pt-BR" smtClean="0"/>
-              <a:t>25/06/2018</a:t>
+              <a:t>27/06/2018</a:t>
             </a:fld>
             <a:endParaRPr lang="pt-BR"/>
           </a:p>
@@ -673,7 +673,7 @@
           <a:p>
             <a:fld id="{7F4DE44C-4E58-4341-A1AF-2DD2D02351DF}" type="datetimeFigureOut">
               <a:rPr lang="pt-BR" smtClean="0"/>
-              <a:t>25/06/2018</a:t>
+              <a:t>27/06/2018</a:t>
             </a:fld>
             <a:endParaRPr lang="pt-BR"/>
           </a:p>
@@ -871,7 +871,7 @@
           <a:p>
             <a:fld id="{7F4DE44C-4E58-4341-A1AF-2DD2D02351DF}" type="datetimeFigureOut">
               <a:rPr lang="pt-BR" smtClean="0"/>
-              <a:t>25/06/2018</a:t>
+              <a:t>27/06/2018</a:t>
             </a:fld>
             <a:endParaRPr lang="pt-BR"/>
           </a:p>
@@ -1146,7 +1146,7 @@
           <a:p>
             <a:fld id="{7F4DE44C-4E58-4341-A1AF-2DD2D02351DF}" type="datetimeFigureOut">
               <a:rPr lang="pt-BR" smtClean="0"/>
-              <a:t>25/06/2018</a:t>
+              <a:t>27/06/2018</a:t>
             </a:fld>
             <a:endParaRPr lang="pt-BR"/>
           </a:p>
@@ -1411,7 +1411,7 @@
           <a:p>
             <a:fld id="{7F4DE44C-4E58-4341-A1AF-2DD2D02351DF}" type="datetimeFigureOut">
               <a:rPr lang="pt-BR" smtClean="0"/>
-              <a:t>25/06/2018</a:t>
+              <a:t>27/06/2018</a:t>
             </a:fld>
             <a:endParaRPr lang="pt-BR"/>
           </a:p>
@@ -1823,7 +1823,7 @@
           <a:p>
             <a:fld id="{7F4DE44C-4E58-4341-A1AF-2DD2D02351DF}" type="datetimeFigureOut">
               <a:rPr lang="pt-BR" smtClean="0"/>
-              <a:t>25/06/2018</a:t>
+              <a:t>27/06/2018</a:t>
             </a:fld>
             <a:endParaRPr lang="pt-BR"/>
           </a:p>
@@ -1964,7 +1964,7 @@
           <a:p>
             <a:fld id="{7F4DE44C-4E58-4341-A1AF-2DD2D02351DF}" type="datetimeFigureOut">
               <a:rPr lang="pt-BR" smtClean="0"/>
-              <a:t>25/06/2018</a:t>
+              <a:t>27/06/2018</a:t>
             </a:fld>
             <a:endParaRPr lang="pt-BR"/>
           </a:p>
@@ -2077,7 +2077,7 @@
           <a:p>
             <a:fld id="{7F4DE44C-4E58-4341-A1AF-2DD2D02351DF}" type="datetimeFigureOut">
               <a:rPr lang="pt-BR" smtClean="0"/>
-              <a:t>25/06/2018</a:t>
+              <a:t>27/06/2018</a:t>
             </a:fld>
             <a:endParaRPr lang="pt-BR"/>
           </a:p>
@@ -2388,7 +2388,7 @@
           <a:p>
             <a:fld id="{7F4DE44C-4E58-4341-A1AF-2DD2D02351DF}" type="datetimeFigureOut">
               <a:rPr lang="pt-BR" smtClean="0"/>
-              <a:t>25/06/2018</a:t>
+              <a:t>27/06/2018</a:t>
             </a:fld>
             <a:endParaRPr lang="pt-BR"/>
           </a:p>
@@ -2676,7 +2676,7 @@
           <a:p>
             <a:fld id="{7F4DE44C-4E58-4341-A1AF-2DD2D02351DF}" type="datetimeFigureOut">
               <a:rPr lang="pt-BR" smtClean="0"/>
-              <a:t>25/06/2018</a:t>
+              <a:t>27/06/2018</a:t>
             </a:fld>
             <a:endParaRPr lang="pt-BR"/>
           </a:p>
@@ -2917,7 +2917,7 @@
           <a:p>
             <a:fld id="{7F4DE44C-4E58-4341-A1AF-2DD2D02351DF}" type="datetimeFigureOut">
               <a:rPr lang="pt-BR" smtClean="0"/>
-              <a:t>25/06/2018</a:t>
+              <a:t>27/06/2018</a:t>
             </a:fld>
             <a:endParaRPr lang="pt-BR"/>
           </a:p>
@@ -3571,6 +3571,93 @@
           </a:p>
         </p:txBody>
       </p:sp>
+      <p:sp>
+        <p:nvSpPr>
+          <p:cNvPr id="4" name="Título 1">
+            <a:extLst>
+              <a:ext uri="{FF2B5EF4-FFF2-40B4-BE49-F238E27FC236}">
+                <a16:creationId xmlns:a16="http://schemas.microsoft.com/office/drawing/2014/main" id="{142FC1AD-2C93-4899-9730-2B393329B804}"/>
+              </a:ext>
+            </a:extLst>
+          </p:cNvPr>
+          <p:cNvSpPr txBox="1">
+            <a:spLocks/>
+          </p:cNvSpPr>
+          <p:nvPr/>
+        </p:nvSpPr>
+        <p:spPr>
+          <a:xfrm>
+            <a:off x="397564" y="4714842"/>
+            <a:ext cx="8587409" cy="443950"/>
+          </a:xfrm>
+          <a:prstGeom prst="rect">
+            <a:avLst/>
+          </a:prstGeom>
+        </p:spPr>
+        <p:txBody>
+          <a:bodyPr vert="horz" lIns="91440" tIns="45720" rIns="91440" bIns="45720" rtlCol="0" anchor="b">
+            <a:normAutofit/>
+          </a:bodyPr>
+          <a:lstStyle>
+            <a:lvl1pPr algn="ctr" defTabSz="685800" rtl="0" eaLnBrk="1" latinLnBrk="0" hangingPunct="1">
+              <a:lnSpc>
+                <a:spcPct val="90000"/>
+              </a:lnSpc>
+              <a:spcBef>
+                <a:spcPct val="0"/>
+              </a:spcBef>
+              <a:buNone/>
+              <a:defRPr sz="4500" kern="1200">
+                <a:solidFill>
+                  <a:schemeClr val="tx1"/>
+                </a:solidFill>
+                <a:latin typeface="+mj-lt"/>
+                <a:ea typeface="+mj-ea"/>
+                <a:cs typeface="+mj-cs"/>
+              </a:defRPr>
+            </a:lvl1pPr>
+          </a:lstStyle>
+          <a:p>
+            <a:r>
+              <a:rPr lang="pt-BR" sz="2000" dirty="0">
+                <a:solidFill>
+                  <a:srgbClr val="DAA600"/>
+                </a:solidFill>
+                <a:latin typeface="DFPOP1-W9" panose="02010609010101010101" pitchFamily="1" charset="-128"/>
+                <a:ea typeface="DFPOP1-W9" panose="02010609010101010101" pitchFamily="1" charset="-128"/>
+              </a:rPr>
+              <a:t>Clovis Oliveira, </a:t>
+            </a:r>
+            <a:r>
+              <a:rPr lang="pt-BR" sz="2000" dirty="0" err="1">
+                <a:solidFill>
+                  <a:srgbClr val="DAA600"/>
+                </a:solidFill>
+                <a:latin typeface="DFPOP1-W9" panose="02010609010101010101" pitchFamily="1" charset="-128"/>
+                <a:ea typeface="DFPOP1-W9" panose="02010609010101010101" pitchFamily="1" charset="-128"/>
+              </a:rPr>
+              <a:t>Fabricia</a:t>
+            </a:r>
+            <a:r>
+              <a:rPr lang="pt-BR" sz="2000" dirty="0">
+                <a:solidFill>
+                  <a:srgbClr val="DAA600"/>
+                </a:solidFill>
+                <a:latin typeface="DFPOP1-W9" panose="02010609010101010101" pitchFamily="1" charset="-128"/>
+                <a:ea typeface="DFPOP1-W9" panose="02010609010101010101" pitchFamily="1" charset="-128"/>
+              </a:rPr>
+              <a:t> Santos, Paulo Victor e Weslley Henrique</a:t>
+            </a:r>
+            <a:endParaRPr lang="pt-BR" sz="1800" dirty="0">
+              <a:solidFill>
+                <a:srgbClr val="DAA600"/>
+              </a:solidFill>
+              <a:latin typeface="DFPOP1-W9" panose="02010609010101010101" pitchFamily="1" charset="-128"/>
+              <a:ea typeface="DFPOP1-W9" panose="02010609010101010101" pitchFamily="1" charset="-128"/>
+            </a:endParaRPr>
+          </a:p>
+        </p:txBody>
+      </p:sp>
     </p:spTree>
     <p:extLst>
       <p:ext uri="{BB962C8B-B14F-4D97-AF65-F5344CB8AC3E}">

</xml_diff>